<commit_message>
Lauffähige Tests und sehr viel neuer Text.
</commit_message>
<xml_diff>
--- a/Vortrag/2023_07_17.pptx
+++ b/Vortrag/2023_07_17.pptx
@@ -4,10 +4,13 @@
   <p:sldMasterIdLst>
     <p:sldMasterId id="2147483648" r:id="rId1"/>
   </p:sldMasterIdLst>
+  <p:notesMasterIdLst>
+    <p:notesMasterId r:id="rId6"/>
+  </p:notesMasterIdLst>
   <p:sldIdLst>
     <p:sldId id="256" r:id="rId2"/>
     <p:sldId id="257" r:id="rId3"/>
-    <p:sldId id="258" r:id="rId4"/>
+    <p:sldId id="260" r:id="rId4"/>
     <p:sldId id="259" r:id="rId5"/>
   </p:sldIdLst>
   <p:sldSz cx="12192000" cy="6858000"/>
@@ -113,12 +116,8 @@
         <p14:section name="Standardabschnitt" id="{300E1F45-619B-4971-BEEE-F31B245F6AD4}">
           <p14:sldIdLst>
             <p14:sldId id="256"/>
-          </p14:sldIdLst>
-        </p14:section>
-        <p14:section name="To-Do" id="{A95AFB5A-A4D2-450A-AC96-476F6AD1155C}">
-          <p14:sldIdLst>
             <p14:sldId id="257"/>
-            <p14:sldId id="258"/>
+            <p14:sldId id="260"/>
             <p14:sldId id="259"/>
           </p14:sldIdLst>
         </p14:section>
@@ -129,6 +128,355 @@
     </p:ext>
   </p:extLst>
 </p:presentation>
+</file>
+
+<file path=ppt/notesMasters/notesMaster1.xml><?xml version="1.0" encoding="utf-8"?>
+<p:notesMaster xmlns:a="http://schemas.openxmlformats.org/drawingml/2006/main" xmlns:r="http://schemas.openxmlformats.org/officeDocument/2006/relationships" xmlns:p="http://schemas.openxmlformats.org/presentationml/2006/main">
+  <p:cSld>
+    <p:bg>
+      <p:bgRef idx="1001">
+        <a:schemeClr val="bg1"/>
+      </p:bgRef>
+    </p:bg>
+    <p:spTree>
+      <p:nvGrpSpPr>
+        <p:cNvPr id="1" name=""/>
+        <p:cNvGrpSpPr/>
+        <p:nvPr/>
+      </p:nvGrpSpPr>
+      <p:grpSpPr>
+        <a:xfrm>
+          <a:off x="0" y="0"/>
+          <a:ext cx="0" cy="0"/>
+          <a:chOff x="0" y="0"/>
+          <a:chExt cx="0" cy="0"/>
+        </a:xfrm>
+      </p:grpSpPr>
+      <p:sp>
+        <p:nvSpPr>
+          <p:cNvPr id="2" name="Kopfzeilenplatzhalter 1"/>
+          <p:cNvSpPr>
+            <a:spLocks noGrp="1"/>
+          </p:cNvSpPr>
+          <p:nvPr>
+            <p:ph type="hdr" sz="quarter"/>
+          </p:nvPr>
+        </p:nvSpPr>
+        <p:spPr>
+          <a:xfrm>
+            <a:off x="0" y="0"/>
+            <a:ext cx="2971800" cy="458788"/>
+          </a:xfrm>
+          <a:prstGeom prst="rect">
+            <a:avLst/>
+          </a:prstGeom>
+        </p:spPr>
+        <p:txBody>
+          <a:bodyPr vert="horz" lIns="91440" tIns="45720" rIns="91440" bIns="45720" rtlCol="0"/>
+          <a:lstStyle>
+            <a:lvl1pPr algn="l">
+              <a:defRPr sz="1200"/>
+            </a:lvl1pPr>
+          </a:lstStyle>
+          <a:p>
+            <a:endParaRPr lang="de-DE"/>
+          </a:p>
+        </p:txBody>
+      </p:sp>
+      <p:sp>
+        <p:nvSpPr>
+          <p:cNvPr id="3" name="Datumsplatzhalter 2"/>
+          <p:cNvSpPr>
+            <a:spLocks noGrp="1"/>
+          </p:cNvSpPr>
+          <p:nvPr>
+            <p:ph type="dt" idx="1"/>
+          </p:nvPr>
+        </p:nvSpPr>
+        <p:spPr>
+          <a:xfrm>
+            <a:off x="3884613" y="0"/>
+            <a:ext cx="2971800" cy="458788"/>
+          </a:xfrm>
+          <a:prstGeom prst="rect">
+            <a:avLst/>
+          </a:prstGeom>
+        </p:spPr>
+        <p:txBody>
+          <a:bodyPr vert="horz" lIns="91440" tIns="45720" rIns="91440" bIns="45720" rtlCol="0"/>
+          <a:lstStyle>
+            <a:lvl1pPr algn="r">
+              <a:defRPr sz="1200"/>
+            </a:lvl1pPr>
+          </a:lstStyle>
+          <a:p>
+            <a:fld id="{DC605537-28DF-4349-8212-871DC56593D8}" type="datetimeFigureOut">
+              <a:rPr lang="de-DE" smtClean="0"/>
+              <a:t>16.07.2023</a:t>
+            </a:fld>
+            <a:endParaRPr lang="de-DE"/>
+          </a:p>
+        </p:txBody>
+      </p:sp>
+      <p:sp>
+        <p:nvSpPr>
+          <p:cNvPr id="4" name="Folienbildplatzhalter 3"/>
+          <p:cNvSpPr>
+            <a:spLocks noGrp="1" noRot="1" noChangeAspect="1"/>
+          </p:cNvSpPr>
+          <p:nvPr>
+            <p:ph type="sldImg" idx="2"/>
+          </p:nvPr>
+        </p:nvSpPr>
+        <p:spPr>
+          <a:xfrm>
+            <a:off x="685800" y="1143000"/>
+            <a:ext cx="5486400" cy="3086100"/>
+          </a:xfrm>
+          <a:prstGeom prst="rect">
+            <a:avLst/>
+          </a:prstGeom>
+          <a:noFill/>
+          <a:ln w="12700">
+            <a:solidFill>
+              <a:prstClr val="black"/>
+            </a:solidFill>
+          </a:ln>
+        </p:spPr>
+        <p:txBody>
+          <a:bodyPr vert="horz" lIns="91440" tIns="45720" rIns="91440" bIns="45720" rtlCol="0" anchor="ctr"/>
+          <a:lstStyle/>
+          <a:p>
+            <a:endParaRPr lang="de-DE"/>
+          </a:p>
+        </p:txBody>
+      </p:sp>
+      <p:sp>
+        <p:nvSpPr>
+          <p:cNvPr id="5" name="Notizenplatzhalter 4"/>
+          <p:cNvSpPr>
+            <a:spLocks noGrp="1"/>
+          </p:cNvSpPr>
+          <p:nvPr>
+            <p:ph type="body" sz="quarter" idx="3"/>
+          </p:nvPr>
+        </p:nvSpPr>
+        <p:spPr>
+          <a:xfrm>
+            <a:off x="685800" y="4400550"/>
+            <a:ext cx="5486400" cy="3600450"/>
+          </a:xfrm>
+          <a:prstGeom prst="rect">
+            <a:avLst/>
+          </a:prstGeom>
+        </p:spPr>
+        <p:txBody>
+          <a:bodyPr vert="horz" lIns="91440" tIns="45720" rIns="91440" bIns="45720" rtlCol="0"/>
+          <a:lstStyle/>
+          <a:p>
+            <a:pPr lvl="0"/>
+            <a:r>
+              <a:rPr lang="de-DE"/>
+              <a:t>Mastertextformat bearbeiten</a:t>
+            </a:r>
+          </a:p>
+          <a:p>
+            <a:pPr lvl="1"/>
+            <a:r>
+              <a:rPr lang="de-DE"/>
+              <a:t>Zweite Ebene</a:t>
+            </a:r>
+          </a:p>
+          <a:p>
+            <a:pPr lvl="2"/>
+            <a:r>
+              <a:rPr lang="de-DE"/>
+              <a:t>Dritte Ebene</a:t>
+            </a:r>
+          </a:p>
+          <a:p>
+            <a:pPr lvl="3"/>
+            <a:r>
+              <a:rPr lang="de-DE"/>
+              <a:t>Vierte Ebene</a:t>
+            </a:r>
+          </a:p>
+          <a:p>
+            <a:pPr lvl="4"/>
+            <a:r>
+              <a:rPr lang="de-DE"/>
+              <a:t>Fünfte Ebene</a:t>
+            </a:r>
+          </a:p>
+        </p:txBody>
+      </p:sp>
+      <p:sp>
+        <p:nvSpPr>
+          <p:cNvPr id="6" name="Fußzeilenplatzhalter 5"/>
+          <p:cNvSpPr>
+            <a:spLocks noGrp="1"/>
+          </p:cNvSpPr>
+          <p:nvPr>
+            <p:ph type="ftr" sz="quarter" idx="4"/>
+          </p:nvPr>
+        </p:nvSpPr>
+        <p:spPr>
+          <a:xfrm>
+            <a:off x="0" y="8685213"/>
+            <a:ext cx="2971800" cy="458787"/>
+          </a:xfrm>
+          <a:prstGeom prst="rect">
+            <a:avLst/>
+          </a:prstGeom>
+        </p:spPr>
+        <p:txBody>
+          <a:bodyPr vert="horz" lIns="91440" tIns="45720" rIns="91440" bIns="45720" rtlCol="0" anchor="b"/>
+          <a:lstStyle>
+            <a:lvl1pPr algn="l">
+              <a:defRPr sz="1200"/>
+            </a:lvl1pPr>
+          </a:lstStyle>
+          <a:p>
+            <a:endParaRPr lang="de-DE"/>
+          </a:p>
+        </p:txBody>
+      </p:sp>
+      <p:sp>
+        <p:nvSpPr>
+          <p:cNvPr id="7" name="Foliennummernplatzhalter 6"/>
+          <p:cNvSpPr>
+            <a:spLocks noGrp="1"/>
+          </p:cNvSpPr>
+          <p:nvPr>
+            <p:ph type="sldNum" sz="quarter" idx="5"/>
+          </p:nvPr>
+        </p:nvSpPr>
+        <p:spPr>
+          <a:xfrm>
+            <a:off x="3884613" y="8685213"/>
+            <a:ext cx="2971800" cy="458787"/>
+          </a:xfrm>
+          <a:prstGeom prst="rect">
+            <a:avLst/>
+          </a:prstGeom>
+        </p:spPr>
+        <p:txBody>
+          <a:bodyPr vert="horz" lIns="91440" tIns="45720" rIns="91440" bIns="45720" rtlCol="0" anchor="b"/>
+          <a:lstStyle>
+            <a:lvl1pPr algn="r">
+              <a:defRPr sz="1200"/>
+            </a:lvl1pPr>
+          </a:lstStyle>
+          <a:p>
+            <a:fld id="{0948F5D0-7086-42F7-B13B-5A3D34DF9393}" type="slidenum">
+              <a:rPr lang="de-DE" smtClean="0"/>
+              <a:t>‹Nr.›</a:t>
+            </a:fld>
+            <a:endParaRPr lang="de-DE"/>
+          </a:p>
+        </p:txBody>
+      </p:sp>
+    </p:spTree>
+    <p:extLst>
+      <p:ext uri="{BB962C8B-B14F-4D97-AF65-F5344CB8AC3E}">
+        <p14:creationId xmlns:p14="http://schemas.microsoft.com/office/powerpoint/2010/main" val="2228911017"/>
+      </p:ext>
+    </p:extLst>
+  </p:cSld>
+  <p:clrMap bg1="lt1" tx1="dk1" bg2="lt2" tx2="dk2" accent1="accent1" accent2="accent2" accent3="accent3" accent4="accent4" accent5="accent5" accent6="accent6" hlink="hlink" folHlink="folHlink"/>
+  <p:notesStyle>
+    <a:lvl1pPr marL="0" algn="l" defTabSz="914400" rtl="0" eaLnBrk="1" latinLnBrk="0" hangingPunct="1">
+      <a:defRPr sz="1200" kern="1200">
+        <a:solidFill>
+          <a:schemeClr val="tx1"/>
+        </a:solidFill>
+        <a:latin typeface="+mn-lt"/>
+        <a:ea typeface="+mn-ea"/>
+        <a:cs typeface="+mn-cs"/>
+      </a:defRPr>
+    </a:lvl1pPr>
+    <a:lvl2pPr marL="457200" algn="l" defTabSz="914400" rtl="0" eaLnBrk="1" latinLnBrk="0" hangingPunct="1">
+      <a:defRPr sz="1200" kern="1200">
+        <a:solidFill>
+          <a:schemeClr val="tx1"/>
+        </a:solidFill>
+        <a:latin typeface="+mn-lt"/>
+        <a:ea typeface="+mn-ea"/>
+        <a:cs typeface="+mn-cs"/>
+      </a:defRPr>
+    </a:lvl2pPr>
+    <a:lvl3pPr marL="914400" algn="l" defTabSz="914400" rtl="0" eaLnBrk="1" latinLnBrk="0" hangingPunct="1">
+      <a:defRPr sz="1200" kern="1200">
+        <a:solidFill>
+          <a:schemeClr val="tx1"/>
+        </a:solidFill>
+        <a:latin typeface="+mn-lt"/>
+        <a:ea typeface="+mn-ea"/>
+        <a:cs typeface="+mn-cs"/>
+      </a:defRPr>
+    </a:lvl3pPr>
+    <a:lvl4pPr marL="1371600" algn="l" defTabSz="914400" rtl="0" eaLnBrk="1" latinLnBrk="0" hangingPunct="1">
+      <a:defRPr sz="1200" kern="1200">
+        <a:solidFill>
+          <a:schemeClr val="tx1"/>
+        </a:solidFill>
+        <a:latin typeface="+mn-lt"/>
+        <a:ea typeface="+mn-ea"/>
+        <a:cs typeface="+mn-cs"/>
+      </a:defRPr>
+    </a:lvl4pPr>
+    <a:lvl5pPr marL="1828800" algn="l" defTabSz="914400" rtl="0" eaLnBrk="1" latinLnBrk="0" hangingPunct="1">
+      <a:defRPr sz="1200" kern="1200">
+        <a:solidFill>
+          <a:schemeClr val="tx1"/>
+        </a:solidFill>
+        <a:latin typeface="+mn-lt"/>
+        <a:ea typeface="+mn-ea"/>
+        <a:cs typeface="+mn-cs"/>
+      </a:defRPr>
+    </a:lvl5pPr>
+    <a:lvl6pPr marL="2286000" algn="l" defTabSz="914400" rtl="0" eaLnBrk="1" latinLnBrk="0" hangingPunct="1">
+      <a:defRPr sz="1200" kern="1200">
+        <a:solidFill>
+          <a:schemeClr val="tx1"/>
+        </a:solidFill>
+        <a:latin typeface="+mn-lt"/>
+        <a:ea typeface="+mn-ea"/>
+        <a:cs typeface="+mn-cs"/>
+      </a:defRPr>
+    </a:lvl6pPr>
+    <a:lvl7pPr marL="2743200" algn="l" defTabSz="914400" rtl="0" eaLnBrk="1" latinLnBrk="0" hangingPunct="1">
+      <a:defRPr sz="1200" kern="1200">
+        <a:solidFill>
+          <a:schemeClr val="tx1"/>
+        </a:solidFill>
+        <a:latin typeface="+mn-lt"/>
+        <a:ea typeface="+mn-ea"/>
+        <a:cs typeface="+mn-cs"/>
+      </a:defRPr>
+    </a:lvl7pPr>
+    <a:lvl8pPr marL="3200400" algn="l" defTabSz="914400" rtl="0" eaLnBrk="1" latinLnBrk="0" hangingPunct="1">
+      <a:defRPr sz="1200" kern="1200">
+        <a:solidFill>
+          <a:schemeClr val="tx1"/>
+        </a:solidFill>
+        <a:latin typeface="+mn-lt"/>
+        <a:ea typeface="+mn-ea"/>
+        <a:cs typeface="+mn-cs"/>
+      </a:defRPr>
+    </a:lvl8pPr>
+    <a:lvl9pPr marL="3657600" algn="l" defTabSz="914400" rtl="0" eaLnBrk="1" latinLnBrk="0" hangingPunct="1">
+      <a:defRPr sz="1200" kern="1200">
+        <a:solidFill>
+          <a:schemeClr val="tx1"/>
+        </a:solidFill>
+        <a:latin typeface="+mn-lt"/>
+        <a:ea typeface="+mn-ea"/>
+        <a:cs typeface="+mn-cs"/>
+      </a:defRPr>
+    </a:lvl9pPr>
+  </p:notesStyle>
+</p:notesMaster>
 </file>
 
 <file path=ppt/slideLayouts/slideLayout1.xml><?xml version="1.0" encoding="utf-8"?>
@@ -276,9 +624,9 @@
           <a:bodyPr/>
           <a:lstStyle/>
           <a:p>
-            <a:fld id="{7CC8BFF4-F455-4D63-A1CF-B9AF3F06E006}" type="datetimeFigureOut">
+            <a:fld id="{794D008A-4714-4F44-9570-E868DC67BC9A}" type="datetime1">
               <a:rPr lang="de-DE" smtClean="0"/>
-              <a:t>14.07.2023</a:t>
+              <a:t>16.07.2023</a:t>
             </a:fld>
             <a:endParaRPr lang="de-DE"/>
           </a:p>
@@ -474,9 +822,9 @@
           <a:bodyPr/>
           <a:lstStyle/>
           <a:p>
-            <a:fld id="{7CC8BFF4-F455-4D63-A1CF-B9AF3F06E006}" type="datetimeFigureOut">
+            <a:fld id="{206EF617-DA89-4A6F-9973-2D1A59BBAE43}" type="datetime1">
               <a:rPr lang="de-DE" smtClean="0"/>
-              <a:t>14.07.2023</a:t>
+              <a:t>16.07.2023</a:t>
             </a:fld>
             <a:endParaRPr lang="de-DE"/>
           </a:p>
@@ -682,9 +1030,9 @@
           <a:bodyPr/>
           <a:lstStyle/>
           <a:p>
-            <a:fld id="{7CC8BFF4-F455-4D63-A1CF-B9AF3F06E006}" type="datetimeFigureOut">
+            <a:fld id="{CA8CAA29-3B6F-48E2-8D05-81FFF046E296}" type="datetime1">
               <a:rPr lang="de-DE" smtClean="0"/>
-              <a:t>14.07.2023</a:t>
+              <a:t>16.07.2023</a:t>
             </a:fld>
             <a:endParaRPr lang="de-DE"/>
           </a:p>
@@ -880,9 +1228,9 @@
           <a:bodyPr/>
           <a:lstStyle/>
           <a:p>
-            <a:fld id="{7CC8BFF4-F455-4D63-A1CF-B9AF3F06E006}" type="datetimeFigureOut">
+            <a:fld id="{535A4B1D-EB6B-448E-8F85-8F8D0CA4337B}" type="datetime1">
               <a:rPr lang="de-DE" smtClean="0"/>
-              <a:t>14.07.2023</a:t>
+              <a:t>16.07.2023</a:t>
             </a:fld>
             <a:endParaRPr lang="de-DE"/>
           </a:p>
@@ -1155,9 +1503,9 @@
           <a:bodyPr/>
           <a:lstStyle/>
           <a:p>
-            <a:fld id="{7CC8BFF4-F455-4D63-A1CF-B9AF3F06E006}" type="datetimeFigureOut">
+            <a:fld id="{B40CB27E-7D55-445E-B8DF-11907CB311A7}" type="datetime1">
               <a:rPr lang="de-DE" smtClean="0"/>
-              <a:t>14.07.2023</a:t>
+              <a:t>16.07.2023</a:t>
             </a:fld>
             <a:endParaRPr lang="de-DE"/>
           </a:p>
@@ -1420,9 +1768,9 @@
           <a:bodyPr/>
           <a:lstStyle/>
           <a:p>
-            <a:fld id="{7CC8BFF4-F455-4D63-A1CF-B9AF3F06E006}" type="datetimeFigureOut">
+            <a:fld id="{01403367-9291-4C3D-B9AB-F6D417EAFA0C}" type="datetime1">
               <a:rPr lang="de-DE" smtClean="0"/>
-              <a:t>14.07.2023</a:t>
+              <a:t>16.07.2023</a:t>
             </a:fld>
             <a:endParaRPr lang="de-DE"/>
           </a:p>
@@ -1832,9 +2180,9 @@
           <a:bodyPr/>
           <a:lstStyle/>
           <a:p>
-            <a:fld id="{7CC8BFF4-F455-4D63-A1CF-B9AF3F06E006}" type="datetimeFigureOut">
+            <a:fld id="{A1CB38F8-E8A9-44F6-99BE-01A481CAD51C}" type="datetime1">
               <a:rPr lang="de-DE" smtClean="0"/>
-              <a:t>14.07.2023</a:t>
+              <a:t>16.07.2023</a:t>
             </a:fld>
             <a:endParaRPr lang="de-DE"/>
           </a:p>
@@ -1973,9 +2321,9 @@
           <a:bodyPr/>
           <a:lstStyle/>
           <a:p>
-            <a:fld id="{7CC8BFF4-F455-4D63-A1CF-B9AF3F06E006}" type="datetimeFigureOut">
+            <a:fld id="{2BBAEA9E-096D-455C-AE33-F650FFA6F0C7}" type="datetime1">
               <a:rPr lang="de-DE" smtClean="0"/>
-              <a:t>14.07.2023</a:t>
+              <a:t>16.07.2023</a:t>
             </a:fld>
             <a:endParaRPr lang="de-DE"/>
           </a:p>
@@ -2086,9 +2434,9 @@
           <a:bodyPr/>
           <a:lstStyle/>
           <a:p>
-            <a:fld id="{7CC8BFF4-F455-4D63-A1CF-B9AF3F06E006}" type="datetimeFigureOut">
+            <a:fld id="{2398C809-850F-4D80-A1C5-3C38D94F8A87}" type="datetime1">
               <a:rPr lang="de-DE" smtClean="0"/>
-              <a:t>14.07.2023</a:t>
+              <a:t>16.07.2023</a:t>
             </a:fld>
             <a:endParaRPr lang="de-DE"/>
           </a:p>
@@ -2397,9 +2745,9 @@
           <a:bodyPr/>
           <a:lstStyle/>
           <a:p>
-            <a:fld id="{7CC8BFF4-F455-4D63-A1CF-B9AF3F06E006}" type="datetimeFigureOut">
+            <a:fld id="{05A6D417-86BC-4947-BDED-7C05EB4ABBDA}" type="datetime1">
               <a:rPr lang="de-DE" smtClean="0"/>
-              <a:t>14.07.2023</a:t>
+              <a:t>16.07.2023</a:t>
             </a:fld>
             <a:endParaRPr lang="de-DE"/>
           </a:p>
@@ -2685,9 +3033,9 @@
           <a:bodyPr/>
           <a:lstStyle/>
           <a:p>
-            <a:fld id="{7CC8BFF4-F455-4D63-A1CF-B9AF3F06E006}" type="datetimeFigureOut">
+            <a:fld id="{30D05331-4B7F-4239-8F70-762C56008DB4}" type="datetime1">
               <a:rPr lang="de-DE" smtClean="0"/>
-              <a:t>14.07.2023</a:t>
+              <a:t>16.07.2023</a:t>
             </a:fld>
             <a:endParaRPr lang="de-DE"/>
           </a:p>
@@ -2926,9 +3274,9 @@
             </a:lvl1pPr>
           </a:lstStyle>
           <a:p>
-            <a:fld id="{7CC8BFF4-F455-4D63-A1CF-B9AF3F06E006}" type="datetimeFigureOut">
+            <a:fld id="{C9164B3A-C3F8-4235-BB10-7D2E52670E42}" type="datetime1">
               <a:rPr lang="de-DE" smtClean="0"/>
-              <a:t>14.07.2023</a:t>
+              <a:t>16.07.2023</a:t>
             </a:fld>
             <a:endParaRPr lang="de-DE"/>
           </a:p>
@@ -3045,6 +3393,7 @@
     <p:sldLayoutId id="2147483658" r:id="rId10"/>
     <p:sldLayoutId id="2147483659" r:id="rId11"/>
   </p:sldLayoutIdLst>
+  <p:hf sldNum="0" hdr="0" dt="0"/>
   <p:txStyles>
     <p:titleStyle>
       <a:lvl1pPr algn="l" defTabSz="914400" rtl="0" eaLnBrk="1" latinLnBrk="0" hangingPunct="1">
@@ -3401,6 +3750,31 @@
           </a:p>
         </p:txBody>
       </p:sp>
+      <p:sp>
+        <p:nvSpPr>
+          <p:cNvPr id="4" name="Fußzeilenplatzhalter 3">
+            <a:extLst>
+              <a:ext uri="{FF2B5EF4-FFF2-40B4-BE49-F238E27FC236}">
+                <a16:creationId xmlns:a16="http://schemas.microsoft.com/office/drawing/2014/main" id="{20E59CFC-D1B1-3B0B-D83E-9DDB5B851942}"/>
+              </a:ext>
+            </a:extLst>
+          </p:cNvPr>
+          <p:cNvSpPr>
+            <a:spLocks noGrp="1"/>
+          </p:cNvSpPr>
+          <p:nvPr>
+            <p:ph type="ftr" sz="quarter" idx="11"/>
+          </p:nvPr>
+        </p:nvSpPr>
+        <p:spPr/>
+        <p:txBody>
+          <a:bodyPr/>
+          <a:lstStyle/>
+          <a:p>
+            <a:endParaRPr lang="de-DE"/>
+          </a:p>
+        </p:txBody>
+      </p:sp>
     </p:spTree>
     <p:extLst>
       <p:ext uri="{BB962C8B-B14F-4D97-AF65-F5344CB8AC3E}">
@@ -3453,8 +3827,12 @@
           <a:lstStyle/>
           <a:p>
             <a:r>
+              <a:rPr lang="de-DE" dirty="0" err="1"/>
+              <a:t>To</a:t>
+            </a:r>
+            <a:r>
               <a:rPr lang="de-DE" dirty="0"/>
-              <a:t>Zu erreichende Ziele </a:t>
+              <a:t>-Dos</a:t>
             </a:r>
           </a:p>
         </p:txBody>
@@ -3492,15 +3870,28 @@
               <a:rPr lang="de-DE" dirty="0">
                 <a:sym typeface="Wingdings" panose="05000000000000000000" pitchFamily="2" charset="2"/>
               </a:rPr>
-              <a:t> Installation, etc.</a:t>
+              <a:t> Installation, etc. </a:t>
+            </a:r>
+            <a:r>
+              <a:rPr lang="de-DE" baseline="30000" dirty="0">
+                <a:sym typeface="Wingdings" panose="05000000000000000000" pitchFamily="2" charset="2"/>
+              </a:rPr>
+              <a:t>[1]</a:t>
+            </a:r>
+            <a:endParaRPr lang="de-DE" baseline="30000" dirty="0"/>
+          </a:p>
+          <a:p>
+            <a:r>
+              <a:rPr lang="de-DE"/>
+              <a:t>Komponentendiagramm </a:t>
+            </a:r>
+            <a:r>
+              <a:rPr lang="de-DE" baseline="30000">
+                <a:sym typeface="Wingdings" panose="05000000000000000000" pitchFamily="2" charset="2"/>
+              </a:rPr>
+              <a:t>[1]</a:t>
             </a:r>
             <a:endParaRPr lang="de-DE" dirty="0"/>
-          </a:p>
-          <a:p>
-            <a:r>
-              <a:rPr lang="de-DE" dirty="0"/>
-              <a:t>Komponentendiagramm</a:t>
-            </a:r>
           </a:p>
           <a:p>
             <a:pPr lvl="1"/>
@@ -3518,8 +3909,57 @@
           </a:p>
           <a:p>
             <a:r>
+              <a:rPr lang="de-DE" dirty="0" err="1"/>
+              <a:t>GTest</a:t>
+            </a:r>
+            <a:r>
               <a:rPr lang="de-DE" dirty="0"/>
-              <a:t>Auf mehreren Geräten lauffähig</a:t>
+              <a:t> besser verstehen</a:t>
+            </a:r>
+          </a:p>
+          <a:p>
+            <a:r>
+              <a:rPr lang="de-DE" dirty="0"/>
+              <a:t>Eignen kleinen Test</a:t>
+            </a:r>
+          </a:p>
+          <a:p>
+            <a:pPr lvl="1"/>
+            <a:r>
+              <a:rPr lang="de-DE" dirty="0"/>
+              <a:t>Log-Dateien anlegen</a:t>
+            </a:r>
+          </a:p>
+        </p:txBody>
+      </p:sp>
+      <p:sp>
+        <p:nvSpPr>
+          <p:cNvPr id="4" name="Fußzeilenplatzhalter 3">
+            <a:extLst>
+              <a:ext uri="{FF2B5EF4-FFF2-40B4-BE49-F238E27FC236}">
+                <a16:creationId xmlns:a16="http://schemas.microsoft.com/office/drawing/2014/main" id="{A0EA8F84-040B-8A03-D3C0-86ED82585768}"/>
+              </a:ext>
+            </a:extLst>
+          </p:cNvPr>
+          <p:cNvSpPr>
+            <a:spLocks noGrp="1"/>
+          </p:cNvSpPr>
+          <p:nvPr>
+            <p:ph type="ftr" sz="quarter" idx="11"/>
+          </p:nvPr>
+        </p:nvSpPr>
+        <p:spPr/>
+        <p:txBody>
+          <a:bodyPr/>
+          <a:lstStyle/>
+          <a:p>
+            <a:r>
+              <a:rPr lang="de-DE" baseline="30000" dirty="0"/>
+              <a:t>[1] </a:t>
+            </a:r>
+            <a:r>
+              <a:rPr lang="de-DE" dirty="0"/>
+              <a:t>Herunterladbar: https://seafile.rlp.net/d/d9e4e53351b44e9baaf7/</a:t>
             </a:r>
           </a:p>
         </p:txBody>
@@ -3559,7 +3999,7 @@
           <p:cNvPr id="2" name="Titel 1">
             <a:extLst>
               <a:ext uri="{FF2B5EF4-FFF2-40B4-BE49-F238E27FC236}">
-                <a16:creationId xmlns:a16="http://schemas.microsoft.com/office/drawing/2014/main" id="{6D592678-D272-61B3-D35B-44A350B8B1AF}"/>
+                <a16:creationId xmlns:a16="http://schemas.microsoft.com/office/drawing/2014/main" id="{AFFA7E4F-676A-78B1-D2B6-0EBB8ED01C2A}"/>
               </a:ext>
             </a:extLst>
           </p:cNvPr>
@@ -3570,72 +4010,95 @@
             <p:ph type="title"/>
           </p:nvPr>
         </p:nvSpPr>
+        <p:spPr>
+          <a:xfrm>
+            <a:off x="167952" y="111967"/>
+            <a:ext cx="3872204" cy="5029200"/>
+          </a:xfrm>
+        </p:spPr>
+        <p:txBody>
+          <a:bodyPr/>
+          <a:lstStyle/>
+          <a:p>
+            <a:r>
+              <a:rPr lang="de-DE" dirty="0"/>
+              <a:t>Komponenten-</a:t>
+            </a:r>
+            <a:br>
+              <a:rPr lang="de-DE" dirty="0"/>
+            </a:br>
+            <a:r>
+              <a:rPr lang="de-DE" dirty="0" err="1"/>
+              <a:t>diagramm</a:t>
+            </a:r>
+            <a:endParaRPr lang="de-DE" dirty="0"/>
+          </a:p>
+        </p:txBody>
+      </p:sp>
+      <p:pic>
+        <p:nvPicPr>
+          <p:cNvPr id="8" name="Inhaltsplatzhalter 7" descr="Ein Bild, das Text, Diagramm, Plan, Karte enthält.&#10;&#10;Automatisch generierte Beschreibung">
+            <a:extLst>
+              <a:ext uri="{FF2B5EF4-FFF2-40B4-BE49-F238E27FC236}">
+                <a16:creationId xmlns:a16="http://schemas.microsoft.com/office/drawing/2014/main" id="{1089480E-3CB3-CF46-F699-9E1106992D69}"/>
+              </a:ext>
+            </a:extLst>
+          </p:cNvPr>
+          <p:cNvPicPr>
+            <a:picLocks noGrp="1" noChangeAspect="1"/>
+          </p:cNvPicPr>
+          <p:nvPr>
+            <p:ph idx="1"/>
+          </p:nvPr>
+        </p:nvPicPr>
+        <p:blipFill>
+          <a:blip r:embed="rId2">
+            <a:extLst>
+              <a:ext uri="{28A0092B-C50C-407E-A947-70E740481C1C}">
+                <a14:useLocalDpi xmlns:a14="http://schemas.microsoft.com/office/drawing/2010/main" val="0"/>
+              </a:ext>
+            </a:extLst>
+          </a:blip>
+          <a:stretch>
+            <a:fillRect/>
+          </a:stretch>
+        </p:blipFill>
+        <p:spPr>
+          <a:xfrm>
+            <a:off x="4180764" y="0"/>
+            <a:ext cx="8011236" cy="6858000"/>
+          </a:xfrm>
+        </p:spPr>
+      </p:pic>
+      <p:sp>
+        <p:nvSpPr>
+          <p:cNvPr id="13" name="Fußzeilenplatzhalter 12">
+            <a:extLst>
+              <a:ext uri="{FF2B5EF4-FFF2-40B4-BE49-F238E27FC236}">
+                <a16:creationId xmlns:a16="http://schemas.microsoft.com/office/drawing/2014/main" id="{2B08D6AE-0C11-C46E-7830-1CC8A4DD3964}"/>
+              </a:ext>
+            </a:extLst>
+          </p:cNvPr>
+          <p:cNvSpPr>
+            <a:spLocks noGrp="1"/>
+          </p:cNvSpPr>
+          <p:nvPr>
+            <p:ph type="ftr" sz="quarter" idx="11"/>
+          </p:nvPr>
+        </p:nvSpPr>
         <p:spPr/>
         <p:txBody>
           <a:bodyPr/>
           <a:lstStyle/>
           <a:p>
-            <a:r>
-              <a:rPr lang="de-DE" dirty="0"/>
-              <a:t>Optional</a:t>
-            </a:r>
-          </a:p>
-        </p:txBody>
-      </p:sp>
-      <p:sp>
-        <p:nvSpPr>
-          <p:cNvPr id="3" name="Inhaltsplatzhalter 2">
-            <a:extLst>
-              <a:ext uri="{FF2B5EF4-FFF2-40B4-BE49-F238E27FC236}">
-                <a16:creationId xmlns:a16="http://schemas.microsoft.com/office/drawing/2014/main" id="{7ACAB308-0800-FB7F-BA30-170DEEDBF763}"/>
-              </a:ext>
-            </a:extLst>
-          </p:cNvPr>
-          <p:cNvSpPr>
-            <a:spLocks noGrp="1"/>
-          </p:cNvSpPr>
-          <p:nvPr>
-            <p:ph idx="1"/>
-          </p:nvPr>
-        </p:nvSpPr>
-        <p:spPr/>
-        <p:txBody>
-          <a:bodyPr/>
-          <a:lstStyle/>
-          <a:p>
-            <a:r>
-              <a:rPr lang="de-DE" dirty="0" err="1"/>
-              <a:t>GTest</a:t>
-            </a:r>
-            <a:r>
-              <a:rPr lang="de-DE" dirty="0"/>
-              <a:t> </a:t>
-            </a:r>
-            <a:r>
-              <a:rPr lang="de-DE"/>
-              <a:t>besser verstehen</a:t>
-            </a:r>
-            <a:endParaRPr lang="de-DE" dirty="0"/>
-          </a:p>
-          <a:p>
-            <a:r>
-              <a:rPr lang="de-DE" dirty="0"/>
-              <a:t>Eignen kleinen Test</a:t>
-            </a:r>
-          </a:p>
-          <a:p>
-            <a:pPr lvl="1"/>
-            <a:r>
-              <a:rPr lang="de-DE" dirty="0"/>
-              <a:t>Log-Dateien anlegen</a:t>
-            </a:r>
+            <a:endParaRPr lang="de-DE"/>
           </a:p>
         </p:txBody>
       </p:sp>
     </p:spTree>
     <p:extLst>
       <p:ext uri="{BB962C8B-B14F-4D97-AF65-F5344CB8AC3E}">
-        <p14:creationId xmlns:p14="http://schemas.microsoft.com/office/powerpoint/2010/main" val="2111693917"/>
+        <p14:creationId xmlns:p14="http://schemas.microsoft.com/office/powerpoint/2010/main" val="3060269593"/>
       </p:ext>
     </p:extLst>
   </p:cSld>
@@ -3685,7 +4148,7 @@
           <a:p>
             <a:r>
               <a:rPr lang="de-DE" dirty="0"/>
-              <a:t>Probleme</a:t>
+              <a:t>Testen</a:t>
             </a:r>
           </a:p>
         </p:txBody>
@@ -3725,16 +4188,58 @@
           <a:p>
             <a:pPr lvl="1"/>
             <a:r>
-              <a:rPr lang="de-DE"/>
-              <a:t>Unterschiedliche Rechner </a:t>
-            </a:r>
-            <a:r>
               <a:rPr lang="de-DE" dirty="0"/>
-              <a:t>anderes Verhalten</a:t>
-            </a:r>
-          </a:p>
-          <a:p>
-            <a:endParaRPr lang="de-DE" dirty="0"/>
+              <a:t>Unterschiedliche Rechner anderes Verhalten</a:t>
+            </a:r>
+          </a:p>
+          <a:p>
+            <a:pPr lvl="1"/>
+            <a:r>
+              <a:rPr lang="de-DE" dirty="0" err="1"/>
+              <a:t>SegFault</a:t>
+            </a:r>
+            <a:r>
+              <a:rPr lang="de-DE" dirty="0"/>
+              <a:t> </a:t>
+            </a:r>
+          </a:p>
+          <a:p>
+            <a:r>
+              <a:rPr lang="de-DE" dirty="0"/>
+              <a:t>Log-File</a:t>
+            </a:r>
+          </a:p>
+          <a:p>
+            <a:pPr lvl="1"/>
+            <a:r>
+              <a:rPr lang="de-DE" dirty="0"/>
+              <a:t>Erstellen ohne Probleme</a:t>
+            </a:r>
+          </a:p>
+        </p:txBody>
+      </p:sp>
+      <p:sp>
+        <p:nvSpPr>
+          <p:cNvPr id="4" name="Fußzeilenplatzhalter 3">
+            <a:extLst>
+              <a:ext uri="{FF2B5EF4-FFF2-40B4-BE49-F238E27FC236}">
+                <a16:creationId xmlns:a16="http://schemas.microsoft.com/office/drawing/2014/main" id="{76F39DFD-6FF8-21FB-8E74-C98214F700CD}"/>
+              </a:ext>
+            </a:extLst>
+          </p:cNvPr>
+          <p:cNvSpPr>
+            <a:spLocks noGrp="1"/>
+          </p:cNvSpPr>
+          <p:nvPr>
+            <p:ph type="ftr" sz="quarter" idx="11"/>
+          </p:nvPr>
+        </p:nvSpPr>
+        <p:spPr/>
+        <p:txBody>
+          <a:bodyPr/>
+          <a:lstStyle/>
+          <a:p>
+            <a:endParaRPr lang="de-DE"/>
           </a:p>
         </p:txBody>
       </p:sp>
@@ -4044,4 +4549,299 @@
     </a:ext>
   </a:extLst>
 </a:theme>
+</file>
+
+<file path=ppt/theme/theme2.xml><?xml version="1.0" encoding="utf-8"?>
+<a:theme xmlns:a="http://schemas.openxmlformats.org/drawingml/2006/main" name="Office">
+  <a:themeElements>
+    <a:clrScheme name="Office">
+      <a:dk1>
+        <a:sysClr val="windowText" lastClr="000000"/>
+      </a:dk1>
+      <a:lt1>
+        <a:sysClr val="window" lastClr="FFFFFF"/>
+      </a:lt1>
+      <a:dk2>
+        <a:srgbClr val="44546A"/>
+      </a:dk2>
+      <a:lt2>
+        <a:srgbClr val="E7E6E6"/>
+      </a:lt2>
+      <a:accent1>
+        <a:srgbClr val="4472C4"/>
+      </a:accent1>
+      <a:accent2>
+        <a:srgbClr val="ED7D31"/>
+      </a:accent2>
+      <a:accent3>
+        <a:srgbClr val="A5A5A5"/>
+      </a:accent3>
+      <a:accent4>
+        <a:srgbClr val="FFC000"/>
+      </a:accent4>
+      <a:accent5>
+        <a:srgbClr val="5B9BD5"/>
+      </a:accent5>
+      <a:accent6>
+        <a:srgbClr val="70AD47"/>
+      </a:accent6>
+      <a:hlink>
+        <a:srgbClr val="0563C1"/>
+      </a:hlink>
+      <a:folHlink>
+        <a:srgbClr val="954F72"/>
+      </a:folHlink>
+    </a:clrScheme>
+    <a:fontScheme name="Office">
+      <a:majorFont>
+        <a:latin typeface="Calibri Light" panose="020F0302020204030204"/>
+        <a:ea typeface=""/>
+        <a:cs typeface=""/>
+        <a:font script="Jpan" typeface="游ゴシック Light"/>
+        <a:font script="Hang" typeface="맑은 고딕"/>
+        <a:font script="Hans" typeface="等线 Light"/>
+        <a:font script="Hant" typeface="新細明體"/>
+        <a:font script="Arab" typeface="Times New Roman"/>
+        <a:font script="Hebr" typeface="Times New Roman"/>
+        <a:font script="Thai" typeface="Angsana New"/>
+        <a:font script="Ethi" typeface="Nyala"/>
+        <a:font script="Beng" typeface="Vrinda"/>
+        <a:font script="Gujr" typeface="Shruti"/>
+        <a:font script="Khmr" typeface="MoolBoran"/>
+        <a:font script="Knda" typeface="Tunga"/>
+        <a:font script="Guru" typeface="Raavi"/>
+        <a:font script="Cans" typeface="Euphemia"/>
+        <a:font script="Cher" typeface="Plantagenet Cherokee"/>
+        <a:font script="Yiii" typeface="Microsoft Yi Baiti"/>
+        <a:font script="Tibt" typeface="Microsoft Himalaya"/>
+        <a:font script="Thaa" typeface="MV Boli"/>
+        <a:font script="Deva" typeface="Mangal"/>
+        <a:font script="Telu" typeface="Gautami"/>
+        <a:font script="Taml" typeface="Latha"/>
+        <a:font script="Syrc" typeface="Estrangelo Edessa"/>
+        <a:font script="Orya" typeface="Kalinga"/>
+        <a:font script="Mlym" typeface="Kartika"/>
+        <a:font script="Laoo" typeface="DokChampa"/>
+        <a:font script="Sinh" typeface="Iskoola Pota"/>
+        <a:font script="Mong" typeface="Mongolian Baiti"/>
+        <a:font script="Viet" typeface="Times New Roman"/>
+        <a:font script="Uigh" typeface="Microsoft Uighur"/>
+        <a:font script="Geor" typeface="Sylfaen"/>
+        <a:font script="Armn" typeface="Arial"/>
+        <a:font script="Bugi" typeface="Leelawadee UI"/>
+        <a:font script="Bopo" typeface="Microsoft JhengHei"/>
+        <a:font script="Java" typeface="Javanese Text"/>
+        <a:font script="Lisu" typeface="Segoe UI"/>
+        <a:font script="Mymr" typeface="Myanmar Text"/>
+        <a:font script="Nkoo" typeface="Ebrima"/>
+        <a:font script="Olck" typeface="Nirmala UI"/>
+        <a:font script="Osma" typeface="Ebrima"/>
+        <a:font script="Phag" typeface="Phagspa"/>
+        <a:font script="Syrn" typeface="Estrangelo Edessa"/>
+        <a:font script="Syrj" typeface="Estrangelo Edessa"/>
+        <a:font script="Syre" typeface="Estrangelo Edessa"/>
+        <a:font script="Sora" typeface="Nirmala UI"/>
+        <a:font script="Tale" typeface="Microsoft Tai Le"/>
+        <a:font script="Talu" typeface="Microsoft New Tai Lue"/>
+        <a:font script="Tfng" typeface="Ebrima"/>
+      </a:majorFont>
+      <a:minorFont>
+        <a:latin typeface="Calibri" panose="020F0502020204030204"/>
+        <a:ea typeface=""/>
+        <a:cs typeface=""/>
+        <a:font script="Jpan" typeface="游ゴシック"/>
+        <a:font script="Hang" typeface="맑은 고딕"/>
+        <a:font script="Hans" typeface="等线"/>
+        <a:font script="Hant" typeface="新細明體"/>
+        <a:font script="Arab" typeface="Arial"/>
+        <a:font script="Hebr" typeface="Arial"/>
+        <a:font script="Thai" typeface="Cordia New"/>
+        <a:font script="Ethi" typeface="Nyala"/>
+        <a:font script="Beng" typeface="Vrinda"/>
+        <a:font script="Gujr" typeface="Shruti"/>
+        <a:font script="Khmr" typeface="DaunPenh"/>
+        <a:font script="Knda" typeface="Tunga"/>
+        <a:font script="Guru" typeface="Raavi"/>
+        <a:font script="Cans" typeface="Euphemia"/>
+        <a:font script="Cher" typeface="Plantagenet Cherokee"/>
+        <a:font script="Yiii" typeface="Microsoft Yi Baiti"/>
+        <a:font script="Tibt" typeface="Microsoft Himalaya"/>
+        <a:font script="Thaa" typeface="MV Boli"/>
+        <a:font script="Deva" typeface="Mangal"/>
+        <a:font script="Telu" typeface="Gautami"/>
+        <a:font script="Taml" typeface="Latha"/>
+        <a:font script="Syrc" typeface="Estrangelo Edessa"/>
+        <a:font script="Orya" typeface="Kalinga"/>
+        <a:font script="Mlym" typeface="Kartika"/>
+        <a:font script="Laoo" typeface="DokChampa"/>
+        <a:font script="Sinh" typeface="Iskoola Pota"/>
+        <a:font script="Mong" typeface="Mongolian Baiti"/>
+        <a:font script="Viet" typeface="Arial"/>
+        <a:font script="Uigh" typeface="Microsoft Uighur"/>
+        <a:font script="Geor" typeface="Sylfaen"/>
+        <a:font script="Armn" typeface="Arial"/>
+        <a:font script="Bugi" typeface="Leelawadee UI"/>
+        <a:font script="Bopo" typeface="Microsoft JhengHei"/>
+        <a:font script="Java" typeface="Javanese Text"/>
+        <a:font script="Lisu" typeface="Segoe UI"/>
+        <a:font script="Mymr" typeface="Myanmar Text"/>
+        <a:font script="Nkoo" typeface="Ebrima"/>
+        <a:font script="Olck" typeface="Nirmala UI"/>
+        <a:font script="Osma" typeface="Ebrima"/>
+        <a:font script="Phag" typeface="Phagspa"/>
+        <a:font script="Syrn" typeface="Estrangelo Edessa"/>
+        <a:font script="Syrj" typeface="Estrangelo Edessa"/>
+        <a:font script="Syre" typeface="Estrangelo Edessa"/>
+        <a:font script="Sora" typeface="Nirmala UI"/>
+        <a:font script="Tale" typeface="Microsoft Tai Le"/>
+        <a:font script="Talu" typeface="Microsoft New Tai Lue"/>
+        <a:font script="Tfng" typeface="Ebrima"/>
+      </a:minorFont>
+    </a:fontScheme>
+    <a:fmtScheme name="Office">
+      <a:fillStyleLst>
+        <a:solidFill>
+          <a:schemeClr val="phClr"/>
+        </a:solidFill>
+        <a:gradFill rotWithShape="1">
+          <a:gsLst>
+            <a:gs pos="0">
+              <a:schemeClr val="phClr">
+                <a:lumMod val="110000"/>
+                <a:satMod val="105000"/>
+                <a:tint val="67000"/>
+              </a:schemeClr>
+            </a:gs>
+            <a:gs pos="50000">
+              <a:schemeClr val="phClr">
+                <a:lumMod val="105000"/>
+                <a:satMod val="103000"/>
+                <a:tint val="73000"/>
+              </a:schemeClr>
+            </a:gs>
+            <a:gs pos="100000">
+              <a:schemeClr val="phClr">
+                <a:lumMod val="105000"/>
+                <a:satMod val="109000"/>
+                <a:tint val="81000"/>
+              </a:schemeClr>
+            </a:gs>
+          </a:gsLst>
+          <a:lin ang="5400000" scaled="0"/>
+        </a:gradFill>
+        <a:gradFill rotWithShape="1">
+          <a:gsLst>
+            <a:gs pos="0">
+              <a:schemeClr val="phClr">
+                <a:satMod val="103000"/>
+                <a:lumMod val="102000"/>
+                <a:tint val="94000"/>
+              </a:schemeClr>
+            </a:gs>
+            <a:gs pos="50000">
+              <a:schemeClr val="phClr">
+                <a:satMod val="110000"/>
+                <a:lumMod val="100000"/>
+                <a:shade val="100000"/>
+              </a:schemeClr>
+            </a:gs>
+            <a:gs pos="100000">
+              <a:schemeClr val="phClr">
+                <a:lumMod val="99000"/>
+                <a:satMod val="120000"/>
+                <a:shade val="78000"/>
+              </a:schemeClr>
+            </a:gs>
+          </a:gsLst>
+          <a:lin ang="5400000" scaled="0"/>
+        </a:gradFill>
+      </a:fillStyleLst>
+      <a:lnStyleLst>
+        <a:ln w="6350" cap="flat" cmpd="sng" algn="ctr">
+          <a:solidFill>
+            <a:schemeClr val="phClr"/>
+          </a:solidFill>
+          <a:prstDash val="solid"/>
+          <a:miter lim="800000"/>
+        </a:ln>
+        <a:ln w="12700" cap="flat" cmpd="sng" algn="ctr">
+          <a:solidFill>
+            <a:schemeClr val="phClr"/>
+          </a:solidFill>
+          <a:prstDash val="solid"/>
+          <a:miter lim="800000"/>
+        </a:ln>
+        <a:ln w="19050" cap="flat" cmpd="sng" algn="ctr">
+          <a:solidFill>
+            <a:schemeClr val="phClr"/>
+          </a:solidFill>
+          <a:prstDash val="solid"/>
+          <a:miter lim="800000"/>
+        </a:ln>
+      </a:lnStyleLst>
+      <a:effectStyleLst>
+        <a:effectStyle>
+          <a:effectLst/>
+        </a:effectStyle>
+        <a:effectStyle>
+          <a:effectLst/>
+        </a:effectStyle>
+        <a:effectStyle>
+          <a:effectLst>
+            <a:outerShdw blurRad="57150" dist="19050" dir="5400000" algn="ctr" rotWithShape="0">
+              <a:srgbClr val="000000">
+                <a:alpha val="63000"/>
+              </a:srgbClr>
+            </a:outerShdw>
+          </a:effectLst>
+        </a:effectStyle>
+      </a:effectStyleLst>
+      <a:bgFillStyleLst>
+        <a:solidFill>
+          <a:schemeClr val="phClr"/>
+        </a:solidFill>
+        <a:solidFill>
+          <a:schemeClr val="phClr">
+            <a:tint val="95000"/>
+            <a:satMod val="170000"/>
+          </a:schemeClr>
+        </a:solidFill>
+        <a:gradFill rotWithShape="1">
+          <a:gsLst>
+            <a:gs pos="0">
+              <a:schemeClr val="phClr">
+                <a:tint val="93000"/>
+                <a:satMod val="150000"/>
+                <a:shade val="98000"/>
+                <a:lumMod val="102000"/>
+              </a:schemeClr>
+            </a:gs>
+            <a:gs pos="50000">
+              <a:schemeClr val="phClr">
+                <a:tint val="98000"/>
+                <a:satMod val="130000"/>
+                <a:shade val="90000"/>
+                <a:lumMod val="103000"/>
+              </a:schemeClr>
+            </a:gs>
+            <a:gs pos="100000">
+              <a:schemeClr val="phClr">
+                <a:shade val="63000"/>
+                <a:satMod val="120000"/>
+              </a:schemeClr>
+            </a:gs>
+          </a:gsLst>
+          <a:lin ang="5400000" scaled="0"/>
+        </a:gradFill>
+      </a:bgFillStyleLst>
+    </a:fmtScheme>
+  </a:themeElements>
+  <a:objectDefaults/>
+  <a:extraClrSchemeLst/>
+  <a:extLst>
+    <a:ext uri="{05A4C25C-085E-4340-85A3-A5531E510DB2}">
+      <thm15:themeFamily xmlns:thm15="http://schemas.microsoft.com/office/thememl/2012/main" name="Office Theme" id="{62F939B6-93AF-4DB8-9C6B-D6C7DFDC589F}" vid="{4A3C46E8-61CC-4603-A589-7422A47A8E4A}"/>
+    </a:ext>
+  </a:extLst>
+</a:theme>
 </file>
</xml_diff>